<commit_message>
Added github link to footers of slides
</commit_message>
<xml_diff>
--- a/Chapter III/Chapter III Knowledge, Reasoning, Planning.pptx
+++ b/Chapter III/Chapter III Knowledge, Reasoning, Planning.pptx
@@ -4,6 +4,9 @@
   <p:sldMasterIdLst>
     <p:sldMasterId id="2147483648" r:id="rId1"/>
   </p:sldMasterIdLst>
+  <p:notesMasterIdLst>
+    <p:notesMasterId r:id="rId14"/>
+  </p:notesMasterIdLst>
   <p:sldIdLst>
     <p:sldId id="256" r:id="rId2"/>
     <p:sldId id="257" r:id="rId3"/>
@@ -123,6 +126,355 @@
 </p:presentation>
 </file>
 
+<file path=ppt/notesMasters/notesMaster1.xml><?xml version="1.0" encoding="utf-8"?>
+<p:notesMaster xmlns:a="http://schemas.openxmlformats.org/drawingml/2006/main" xmlns:r="http://schemas.openxmlformats.org/officeDocument/2006/relationships" xmlns:p="http://schemas.openxmlformats.org/presentationml/2006/main">
+  <p:cSld>
+    <p:bg>
+      <p:bgRef idx="1001">
+        <a:schemeClr val="bg1"/>
+      </p:bgRef>
+    </p:bg>
+    <p:spTree>
+      <p:nvGrpSpPr>
+        <p:cNvPr id="1" name=""/>
+        <p:cNvGrpSpPr/>
+        <p:nvPr/>
+      </p:nvGrpSpPr>
+      <p:grpSpPr>
+        <a:xfrm>
+          <a:off x="0" y="0"/>
+          <a:ext cx="0" cy="0"/>
+          <a:chOff x="0" y="0"/>
+          <a:chExt cx="0" cy="0"/>
+        </a:xfrm>
+      </p:grpSpPr>
+      <p:sp>
+        <p:nvSpPr>
+          <p:cNvPr id="2" name="Header Placeholder 1"/>
+          <p:cNvSpPr>
+            <a:spLocks noGrp="1"/>
+          </p:cNvSpPr>
+          <p:nvPr>
+            <p:ph type="hdr" sz="quarter"/>
+          </p:nvPr>
+        </p:nvSpPr>
+        <p:spPr>
+          <a:xfrm>
+            <a:off x="0" y="0"/>
+            <a:ext cx="2971800" cy="458788"/>
+          </a:xfrm>
+          <a:prstGeom prst="rect">
+            <a:avLst/>
+          </a:prstGeom>
+        </p:spPr>
+        <p:txBody>
+          <a:bodyPr vert="horz" lIns="91440" tIns="45720" rIns="91440" bIns="45720" rtlCol="0"/>
+          <a:lstStyle>
+            <a:lvl1pPr algn="l">
+              <a:defRPr sz="1200"/>
+            </a:lvl1pPr>
+          </a:lstStyle>
+          <a:p>
+            <a:endParaRPr lang="en-US"/>
+          </a:p>
+        </p:txBody>
+      </p:sp>
+      <p:sp>
+        <p:nvSpPr>
+          <p:cNvPr id="3" name="Date Placeholder 2"/>
+          <p:cNvSpPr>
+            <a:spLocks noGrp="1"/>
+          </p:cNvSpPr>
+          <p:nvPr>
+            <p:ph type="dt" idx="1"/>
+          </p:nvPr>
+        </p:nvSpPr>
+        <p:spPr>
+          <a:xfrm>
+            <a:off x="3884613" y="0"/>
+            <a:ext cx="2971800" cy="458788"/>
+          </a:xfrm>
+          <a:prstGeom prst="rect">
+            <a:avLst/>
+          </a:prstGeom>
+        </p:spPr>
+        <p:txBody>
+          <a:bodyPr vert="horz" lIns="91440" tIns="45720" rIns="91440" bIns="45720" rtlCol="0"/>
+          <a:lstStyle>
+            <a:lvl1pPr algn="r">
+              <a:defRPr sz="1200"/>
+            </a:lvl1pPr>
+          </a:lstStyle>
+          <a:p>
+            <a:fld id="{0931D695-FEE5-43FF-BCCA-F31742FF745D}" type="datetimeFigureOut">
+              <a:rPr lang="en-US" smtClean="0"/>
+              <a:t>4/28/2024</a:t>
+            </a:fld>
+            <a:endParaRPr lang="en-US"/>
+          </a:p>
+        </p:txBody>
+      </p:sp>
+      <p:sp>
+        <p:nvSpPr>
+          <p:cNvPr id="4" name="Slide Image Placeholder 3"/>
+          <p:cNvSpPr>
+            <a:spLocks noGrp="1" noRot="1" noChangeAspect="1"/>
+          </p:cNvSpPr>
+          <p:nvPr>
+            <p:ph type="sldImg" idx="2"/>
+          </p:nvPr>
+        </p:nvSpPr>
+        <p:spPr>
+          <a:xfrm>
+            <a:off x="685800" y="1143000"/>
+            <a:ext cx="5486400" cy="3086100"/>
+          </a:xfrm>
+          <a:prstGeom prst="rect">
+            <a:avLst/>
+          </a:prstGeom>
+          <a:noFill/>
+          <a:ln w="12700">
+            <a:solidFill>
+              <a:prstClr val="black"/>
+            </a:solidFill>
+          </a:ln>
+        </p:spPr>
+        <p:txBody>
+          <a:bodyPr vert="horz" lIns="91440" tIns="45720" rIns="91440" bIns="45720" rtlCol="0" anchor="ctr"/>
+          <a:lstStyle/>
+          <a:p>
+            <a:endParaRPr lang="en-US"/>
+          </a:p>
+        </p:txBody>
+      </p:sp>
+      <p:sp>
+        <p:nvSpPr>
+          <p:cNvPr id="5" name="Notes Placeholder 4"/>
+          <p:cNvSpPr>
+            <a:spLocks noGrp="1"/>
+          </p:cNvSpPr>
+          <p:nvPr>
+            <p:ph type="body" sz="quarter" idx="3"/>
+          </p:nvPr>
+        </p:nvSpPr>
+        <p:spPr>
+          <a:xfrm>
+            <a:off x="685800" y="4400550"/>
+            <a:ext cx="5486400" cy="3600450"/>
+          </a:xfrm>
+          <a:prstGeom prst="rect">
+            <a:avLst/>
+          </a:prstGeom>
+        </p:spPr>
+        <p:txBody>
+          <a:bodyPr vert="horz" lIns="91440" tIns="45720" rIns="91440" bIns="45720" rtlCol="0"/>
+          <a:lstStyle/>
+          <a:p>
+            <a:pPr lvl="0"/>
+            <a:r>
+              <a:rPr lang="en-US"/>
+              <a:t>Click to edit Master text styles</a:t>
+            </a:r>
+          </a:p>
+          <a:p>
+            <a:pPr lvl="1"/>
+            <a:r>
+              <a:rPr lang="en-US"/>
+              <a:t>Second level</a:t>
+            </a:r>
+          </a:p>
+          <a:p>
+            <a:pPr lvl="2"/>
+            <a:r>
+              <a:rPr lang="en-US"/>
+              <a:t>Third level</a:t>
+            </a:r>
+          </a:p>
+          <a:p>
+            <a:pPr lvl="3"/>
+            <a:r>
+              <a:rPr lang="en-US"/>
+              <a:t>Fourth level</a:t>
+            </a:r>
+          </a:p>
+          <a:p>
+            <a:pPr lvl="4"/>
+            <a:r>
+              <a:rPr lang="en-US"/>
+              <a:t>Fifth level</a:t>
+            </a:r>
+          </a:p>
+        </p:txBody>
+      </p:sp>
+      <p:sp>
+        <p:nvSpPr>
+          <p:cNvPr id="6" name="Footer Placeholder 5"/>
+          <p:cNvSpPr>
+            <a:spLocks noGrp="1"/>
+          </p:cNvSpPr>
+          <p:nvPr>
+            <p:ph type="ftr" sz="quarter" idx="4"/>
+          </p:nvPr>
+        </p:nvSpPr>
+        <p:spPr>
+          <a:xfrm>
+            <a:off x="0" y="8685213"/>
+            <a:ext cx="2971800" cy="458787"/>
+          </a:xfrm>
+          <a:prstGeom prst="rect">
+            <a:avLst/>
+          </a:prstGeom>
+        </p:spPr>
+        <p:txBody>
+          <a:bodyPr vert="horz" lIns="91440" tIns="45720" rIns="91440" bIns="45720" rtlCol="0" anchor="b"/>
+          <a:lstStyle>
+            <a:lvl1pPr algn="l">
+              <a:defRPr sz="1200"/>
+            </a:lvl1pPr>
+          </a:lstStyle>
+          <a:p>
+            <a:endParaRPr lang="en-US"/>
+          </a:p>
+        </p:txBody>
+      </p:sp>
+      <p:sp>
+        <p:nvSpPr>
+          <p:cNvPr id="7" name="Slide Number Placeholder 6"/>
+          <p:cNvSpPr>
+            <a:spLocks noGrp="1"/>
+          </p:cNvSpPr>
+          <p:nvPr>
+            <p:ph type="sldNum" sz="quarter" idx="5"/>
+          </p:nvPr>
+        </p:nvSpPr>
+        <p:spPr>
+          <a:xfrm>
+            <a:off x="3884613" y="8685213"/>
+            <a:ext cx="2971800" cy="458787"/>
+          </a:xfrm>
+          <a:prstGeom prst="rect">
+            <a:avLst/>
+          </a:prstGeom>
+        </p:spPr>
+        <p:txBody>
+          <a:bodyPr vert="horz" lIns="91440" tIns="45720" rIns="91440" bIns="45720" rtlCol="0" anchor="b"/>
+          <a:lstStyle>
+            <a:lvl1pPr algn="r">
+              <a:defRPr sz="1200"/>
+            </a:lvl1pPr>
+          </a:lstStyle>
+          <a:p>
+            <a:fld id="{6DCFE257-3168-49C5-AB07-66EC96DE5B91}" type="slidenum">
+              <a:rPr lang="en-US" smtClean="0"/>
+              <a:t>‹#›</a:t>
+            </a:fld>
+            <a:endParaRPr lang="en-US"/>
+          </a:p>
+        </p:txBody>
+      </p:sp>
+    </p:spTree>
+    <p:extLst>
+      <p:ext uri="{BB962C8B-B14F-4D97-AF65-F5344CB8AC3E}">
+        <p14:creationId xmlns:p14="http://schemas.microsoft.com/office/powerpoint/2010/main" val="777350315"/>
+      </p:ext>
+    </p:extLst>
+  </p:cSld>
+  <p:clrMap bg1="lt1" tx1="dk1" bg2="lt2" tx2="dk2" accent1="accent1" accent2="accent2" accent3="accent3" accent4="accent4" accent5="accent5" accent6="accent6" hlink="hlink" folHlink="folHlink"/>
+  <p:notesStyle>
+    <a:lvl1pPr marL="0" algn="l" defTabSz="914400" rtl="0" eaLnBrk="1" latinLnBrk="0" hangingPunct="1">
+      <a:defRPr sz="1200" kern="1200">
+        <a:solidFill>
+          <a:schemeClr val="tx1"/>
+        </a:solidFill>
+        <a:latin typeface="+mn-lt"/>
+        <a:ea typeface="+mn-ea"/>
+        <a:cs typeface="+mn-cs"/>
+      </a:defRPr>
+    </a:lvl1pPr>
+    <a:lvl2pPr marL="457200" algn="l" defTabSz="914400" rtl="0" eaLnBrk="1" latinLnBrk="0" hangingPunct="1">
+      <a:defRPr sz="1200" kern="1200">
+        <a:solidFill>
+          <a:schemeClr val="tx1"/>
+        </a:solidFill>
+        <a:latin typeface="+mn-lt"/>
+        <a:ea typeface="+mn-ea"/>
+        <a:cs typeface="+mn-cs"/>
+      </a:defRPr>
+    </a:lvl2pPr>
+    <a:lvl3pPr marL="914400" algn="l" defTabSz="914400" rtl="0" eaLnBrk="1" latinLnBrk="0" hangingPunct="1">
+      <a:defRPr sz="1200" kern="1200">
+        <a:solidFill>
+          <a:schemeClr val="tx1"/>
+        </a:solidFill>
+        <a:latin typeface="+mn-lt"/>
+        <a:ea typeface="+mn-ea"/>
+        <a:cs typeface="+mn-cs"/>
+      </a:defRPr>
+    </a:lvl3pPr>
+    <a:lvl4pPr marL="1371600" algn="l" defTabSz="914400" rtl="0" eaLnBrk="1" latinLnBrk="0" hangingPunct="1">
+      <a:defRPr sz="1200" kern="1200">
+        <a:solidFill>
+          <a:schemeClr val="tx1"/>
+        </a:solidFill>
+        <a:latin typeface="+mn-lt"/>
+        <a:ea typeface="+mn-ea"/>
+        <a:cs typeface="+mn-cs"/>
+      </a:defRPr>
+    </a:lvl4pPr>
+    <a:lvl5pPr marL="1828800" algn="l" defTabSz="914400" rtl="0" eaLnBrk="1" latinLnBrk="0" hangingPunct="1">
+      <a:defRPr sz="1200" kern="1200">
+        <a:solidFill>
+          <a:schemeClr val="tx1"/>
+        </a:solidFill>
+        <a:latin typeface="+mn-lt"/>
+        <a:ea typeface="+mn-ea"/>
+        <a:cs typeface="+mn-cs"/>
+      </a:defRPr>
+    </a:lvl5pPr>
+    <a:lvl6pPr marL="2286000" algn="l" defTabSz="914400" rtl="0" eaLnBrk="1" latinLnBrk="0" hangingPunct="1">
+      <a:defRPr sz="1200" kern="1200">
+        <a:solidFill>
+          <a:schemeClr val="tx1"/>
+        </a:solidFill>
+        <a:latin typeface="+mn-lt"/>
+        <a:ea typeface="+mn-ea"/>
+        <a:cs typeface="+mn-cs"/>
+      </a:defRPr>
+    </a:lvl6pPr>
+    <a:lvl7pPr marL="2743200" algn="l" defTabSz="914400" rtl="0" eaLnBrk="1" latinLnBrk="0" hangingPunct="1">
+      <a:defRPr sz="1200" kern="1200">
+        <a:solidFill>
+          <a:schemeClr val="tx1"/>
+        </a:solidFill>
+        <a:latin typeface="+mn-lt"/>
+        <a:ea typeface="+mn-ea"/>
+        <a:cs typeface="+mn-cs"/>
+      </a:defRPr>
+    </a:lvl7pPr>
+    <a:lvl8pPr marL="3200400" algn="l" defTabSz="914400" rtl="0" eaLnBrk="1" latinLnBrk="0" hangingPunct="1">
+      <a:defRPr sz="1200" kern="1200">
+        <a:solidFill>
+          <a:schemeClr val="tx1"/>
+        </a:solidFill>
+        <a:latin typeface="+mn-lt"/>
+        <a:ea typeface="+mn-ea"/>
+        <a:cs typeface="+mn-cs"/>
+      </a:defRPr>
+    </a:lvl8pPr>
+    <a:lvl9pPr marL="3657600" algn="l" defTabSz="914400" rtl="0" eaLnBrk="1" latinLnBrk="0" hangingPunct="1">
+      <a:defRPr sz="1200" kern="1200">
+        <a:solidFill>
+          <a:schemeClr val="tx1"/>
+        </a:solidFill>
+        <a:latin typeface="+mn-lt"/>
+        <a:ea typeface="+mn-ea"/>
+        <a:cs typeface="+mn-cs"/>
+      </a:defRPr>
+    </a:lvl9pPr>
+  </p:notesStyle>
+</p:notesMaster>
+</file>
+
 <file path=ppt/slideLayouts/slideLayout1.xml><?xml version="1.0" encoding="utf-8"?>
 <p:sldLayout xmlns:a="http://schemas.openxmlformats.org/drawingml/2006/main" xmlns:r="http://schemas.openxmlformats.org/officeDocument/2006/relationships" xmlns:p="http://schemas.openxmlformats.org/presentationml/2006/main" type="title" preserve="1">
   <p:cSld name="Title Slide">
@@ -268,9 +620,9 @@
           <a:bodyPr/>
           <a:lstStyle/>
           <a:p>
-            <a:fld id="{333BFBE1-97EC-4C91-A68C-092309E4BA50}" type="datetimeFigureOut">
+            <a:fld id="{B85AEA2E-9589-4603-8DB5-AA28BD8DD22E}" type="datetime1">
               <a:rPr lang="en-US" smtClean="0"/>
-              <a:t>4/21/2024</a:t>
+              <a:t>4/28/2024</a:t>
             </a:fld>
             <a:endParaRPr lang="en-US"/>
           </a:p>
@@ -297,7 +649,10 @@
           <a:bodyPr/>
           <a:lstStyle/>
           <a:p>
-            <a:endParaRPr lang="en-US"/>
+            <a:r>
+              <a:rPr lang="en-US"/>
+              <a:t>GitHub repository: https://github.com/Nguh-Prince/Intro-to-AI</a:t>
+            </a:r>
           </a:p>
         </p:txBody>
       </p:sp>
@@ -466,9 +821,9 @@
           <a:bodyPr/>
           <a:lstStyle/>
           <a:p>
-            <a:fld id="{333BFBE1-97EC-4C91-A68C-092309E4BA50}" type="datetimeFigureOut">
+            <a:fld id="{40571079-F013-46E5-823F-FBA77971C57E}" type="datetime1">
               <a:rPr lang="en-US" smtClean="0"/>
-              <a:t>4/21/2024</a:t>
+              <a:t>4/28/2024</a:t>
             </a:fld>
             <a:endParaRPr lang="en-US"/>
           </a:p>
@@ -495,7 +850,10 @@
           <a:bodyPr/>
           <a:lstStyle/>
           <a:p>
-            <a:endParaRPr lang="en-US"/>
+            <a:r>
+              <a:rPr lang="en-US"/>
+              <a:t>GitHub repository: https://github.com/Nguh-Prince/Intro-to-AI</a:t>
+            </a:r>
           </a:p>
         </p:txBody>
       </p:sp>
@@ -674,9 +1032,9 @@
           <a:bodyPr/>
           <a:lstStyle/>
           <a:p>
-            <a:fld id="{333BFBE1-97EC-4C91-A68C-092309E4BA50}" type="datetimeFigureOut">
+            <a:fld id="{84E22A34-CA1F-432E-B6A5-181D6EA8F5C4}" type="datetime1">
               <a:rPr lang="en-US" smtClean="0"/>
-              <a:t>4/21/2024</a:t>
+              <a:t>4/28/2024</a:t>
             </a:fld>
             <a:endParaRPr lang="en-US"/>
           </a:p>
@@ -703,7 +1061,10 @@
           <a:bodyPr/>
           <a:lstStyle/>
           <a:p>
-            <a:endParaRPr lang="en-US"/>
+            <a:r>
+              <a:rPr lang="en-US"/>
+              <a:t>GitHub repository: https://github.com/Nguh-Prince/Intro-to-AI</a:t>
+            </a:r>
           </a:p>
         </p:txBody>
       </p:sp>
@@ -872,9 +1233,9 @@
           <a:bodyPr/>
           <a:lstStyle/>
           <a:p>
-            <a:fld id="{333BFBE1-97EC-4C91-A68C-092309E4BA50}" type="datetimeFigureOut">
+            <a:fld id="{6174674D-2EFF-46FD-AE46-CD5A1294BF75}" type="datetime1">
               <a:rPr lang="en-US" smtClean="0"/>
-              <a:t>4/21/2024</a:t>
+              <a:t>4/28/2024</a:t>
             </a:fld>
             <a:endParaRPr lang="en-US"/>
           </a:p>
@@ -901,7 +1262,10 @@
           <a:bodyPr/>
           <a:lstStyle/>
           <a:p>
-            <a:endParaRPr lang="en-US"/>
+            <a:r>
+              <a:rPr lang="en-US"/>
+              <a:t>GitHub repository: https://github.com/Nguh-Prince/Intro-to-AI</a:t>
+            </a:r>
           </a:p>
         </p:txBody>
       </p:sp>
@@ -1147,9 +1511,9 @@
           <a:bodyPr/>
           <a:lstStyle/>
           <a:p>
-            <a:fld id="{333BFBE1-97EC-4C91-A68C-092309E4BA50}" type="datetimeFigureOut">
+            <a:fld id="{9594B347-EB77-4520-9E66-7078413883FA}" type="datetime1">
               <a:rPr lang="en-US" smtClean="0"/>
-              <a:t>4/21/2024</a:t>
+              <a:t>4/28/2024</a:t>
             </a:fld>
             <a:endParaRPr lang="en-US"/>
           </a:p>
@@ -1176,7 +1540,10 @@
           <a:bodyPr/>
           <a:lstStyle/>
           <a:p>
-            <a:endParaRPr lang="en-US"/>
+            <a:r>
+              <a:rPr lang="en-US"/>
+              <a:t>GitHub repository: https://github.com/Nguh-Prince/Intro-to-AI</a:t>
+            </a:r>
           </a:p>
         </p:txBody>
       </p:sp>
@@ -1412,9 +1779,9 @@
           <a:bodyPr/>
           <a:lstStyle/>
           <a:p>
-            <a:fld id="{333BFBE1-97EC-4C91-A68C-092309E4BA50}" type="datetimeFigureOut">
+            <a:fld id="{AA24B5E2-EE95-48E4-B81D-B1E0CE212BA4}" type="datetime1">
               <a:rPr lang="en-US" smtClean="0"/>
-              <a:t>4/21/2024</a:t>
+              <a:t>4/28/2024</a:t>
             </a:fld>
             <a:endParaRPr lang="en-US"/>
           </a:p>
@@ -1441,7 +1808,10 @@
           <a:bodyPr/>
           <a:lstStyle/>
           <a:p>
-            <a:endParaRPr lang="en-US"/>
+            <a:r>
+              <a:rPr lang="en-US"/>
+              <a:t>GitHub repository: https://github.com/Nguh-Prince/Intro-to-AI</a:t>
+            </a:r>
           </a:p>
         </p:txBody>
       </p:sp>
@@ -1824,9 +2194,9 @@
           <a:bodyPr/>
           <a:lstStyle/>
           <a:p>
-            <a:fld id="{333BFBE1-97EC-4C91-A68C-092309E4BA50}" type="datetimeFigureOut">
+            <a:fld id="{B433A8B4-1390-4DBF-B4AA-890132F02010}" type="datetime1">
               <a:rPr lang="en-US" smtClean="0"/>
-              <a:t>4/21/2024</a:t>
+              <a:t>4/28/2024</a:t>
             </a:fld>
             <a:endParaRPr lang="en-US"/>
           </a:p>
@@ -1853,7 +2223,10 @@
           <a:bodyPr/>
           <a:lstStyle/>
           <a:p>
-            <a:endParaRPr lang="en-US"/>
+            <a:r>
+              <a:rPr lang="en-US"/>
+              <a:t>GitHub repository: https://github.com/Nguh-Prince/Intro-to-AI</a:t>
+            </a:r>
           </a:p>
         </p:txBody>
       </p:sp>
@@ -1965,9 +2338,9 @@
           <a:bodyPr/>
           <a:lstStyle/>
           <a:p>
-            <a:fld id="{333BFBE1-97EC-4C91-A68C-092309E4BA50}" type="datetimeFigureOut">
+            <a:fld id="{4BE2C3DC-3A42-4BB6-878A-F47C30650EA9}" type="datetime1">
               <a:rPr lang="en-US" smtClean="0"/>
-              <a:t>4/21/2024</a:t>
+              <a:t>4/28/2024</a:t>
             </a:fld>
             <a:endParaRPr lang="en-US"/>
           </a:p>
@@ -1994,7 +2367,10 @@
           <a:bodyPr/>
           <a:lstStyle/>
           <a:p>
-            <a:endParaRPr lang="en-US"/>
+            <a:r>
+              <a:rPr lang="en-US"/>
+              <a:t>GitHub repository: https://github.com/Nguh-Prince/Intro-to-AI</a:t>
+            </a:r>
           </a:p>
         </p:txBody>
       </p:sp>
@@ -2078,9 +2454,9 @@
           <a:bodyPr/>
           <a:lstStyle/>
           <a:p>
-            <a:fld id="{333BFBE1-97EC-4C91-A68C-092309E4BA50}" type="datetimeFigureOut">
+            <a:fld id="{826CFAF3-D006-4060-9FFA-8818977CC9EA}" type="datetime1">
               <a:rPr lang="en-US" smtClean="0"/>
-              <a:t>4/21/2024</a:t>
+              <a:t>4/28/2024</a:t>
             </a:fld>
             <a:endParaRPr lang="en-US"/>
           </a:p>
@@ -2107,7 +2483,10 @@
           <a:bodyPr/>
           <a:lstStyle/>
           <a:p>
-            <a:endParaRPr lang="en-US"/>
+            <a:r>
+              <a:rPr lang="en-US"/>
+              <a:t>GitHub repository: https://github.com/Nguh-Prince/Intro-to-AI</a:t>
+            </a:r>
           </a:p>
         </p:txBody>
       </p:sp>
@@ -2389,9 +2768,9 @@
           <a:bodyPr/>
           <a:lstStyle/>
           <a:p>
-            <a:fld id="{333BFBE1-97EC-4C91-A68C-092309E4BA50}" type="datetimeFigureOut">
+            <a:fld id="{3A21DDB9-AB6C-4159-BD91-376B62583B60}" type="datetime1">
               <a:rPr lang="en-US" smtClean="0"/>
-              <a:t>4/21/2024</a:t>
+              <a:t>4/28/2024</a:t>
             </a:fld>
             <a:endParaRPr lang="en-US"/>
           </a:p>
@@ -2418,7 +2797,10 @@
           <a:bodyPr/>
           <a:lstStyle/>
           <a:p>
-            <a:endParaRPr lang="en-US"/>
+            <a:r>
+              <a:rPr lang="en-US"/>
+              <a:t>GitHub repository: https://github.com/Nguh-Prince/Intro-to-AI</a:t>
+            </a:r>
           </a:p>
         </p:txBody>
       </p:sp>
@@ -2677,9 +3059,9 @@
           <a:bodyPr/>
           <a:lstStyle/>
           <a:p>
-            <a:fld id="{333BFBE1-97EC-4C91-A68C-092309E4BA50}" type="datetimeFigureOut">
+            <a:fld id="{97DC7CB6-57F2-46B1-986B-3AFC817BCA71}" type="datetime1">
               <a:rPr lang="en-US" smtClean="0"/>
-              <a:t>4/21/2024</a:t>
+              <a:t>4/28/2024</a:t>
             </a:fld>
             <a:endParaRPr lang="en-US"/>
           </a:p>
@@ -2706,7 +3088,10 @@
           <a:bodyPr/>
           <a:lstStyle/>
           <a:p>
-            <a:endParaRPr lang="en-US"/>
+            <a:r>
+              <a:rPr lang="en-US"/>
+              <a:t>GitHub repository: https://github.com/Nguh-Prince/Intro-to-AI</a:t>
+            </a:r>
           </a:p>
         </p:txBody>
       </p:sp>
@@ -2918,9 +3303,9 @@
             </a:lvl1pPr>
           </a:lstStyle>
           <a:p>
-            <a:fld id="{333BFBE1-97EC-4C91-A68C-092309E4BA50}" type="datetimeFigureOut">
+            <a:fld id="{A6465D74-914E-426A-8E67-0672DBD5D753}" type="datetime1">
               <a:rPr lang="en-US" smtClean="0"/>
-              <a:t>4/21/2024</a:t>
+              <a:t>4/28/2024</a:t>
             </a:fld>
             <a:endParaRPr lang="en-US"/>
           </a:p>
@@ -2965,7 +3350,10 @@
             </a:lvl1pPr>
           </a:lstStyle>
           <a:p>
-            <a:endParaRPr lang="en-US"/>
+            <a:r>
+              <a:rPr lang="en-US"/>
+              <a:t>GitHub repository: https://github.com/Nguh-Prince/Intro-to-AI</a:t>
+            </a:r>
           </a:p>
         </p:txBody>
       </p:sp>
@@ -3037,6 +3425,7 @@
     <p:sldLayoutId id="2147483658" r:id="rId10"/>
     <p:sldLayoutId id="2147483659" r:id="rId11"/>
   </p:sldLayoutIdLst>
+  <p:hf sldNum="0" hdr="0" dt="0"/>
   <p:txStyles>
     <p:titleStyle>
       <a:lvl1pPr algn="l" defTabSz="914400" rtl="0" eaLnBrk="1" latinLnBrk="0" hangingPunct="1">
@@ -3355,8 +3744,8 @@
         </p:nvSpPr>
         <p:spPr>
           <a:xfrm>
-            <a:off x="1524000" y="2235200"/>
-            <a:ext cx="9144000" cy="2387600"/>
+            <a:off x="1524000" y="2489200"/>
+            <a:ext cx="9144000" cy="1879600"/>
           </a:xfrm>
         </p:spPr>
         <p:txBody>
@@ -3501,6 +3890,34 @@
           </a:p>
         </p:txBody>
       </p:sp>
+      <p:sp>
+        <p:nvSpPr>
+          <p:cNvPr id="4" name="Footer Placeholder 3">
+            <a:extLst>
+              <a:ext uri="{FF2B5EF4-FFF2-40B4-BE49-F238E27FC236}">
+                <a16:creationId xmlns:a16="http://schemas.microsoft.com/office/drawing/2014/main" id="{17DE85D3-8DC0-F27A-9848-C6E72E159B98}"/>
+              </a:ext>
+            </a:extLst>
+          </p:cNvPr>
+          <p:cNvSpPr>
+            <a:spLocks noGrp="1"/>
+          </p:cNvSpPr>
+          <p:nvPr>
+            <p:ph type="ftr" sz="quarter" idx="11"/>
+          </p:nvPr>
+        </p:nvSpPr>
+        <p:spPr/>
+        <p:txBody>
+          <a:bodyPr/>
+          <a:lstStyle/>
+          <a:p>
+            <a:r>
+              <a:rPr lang="en-US"/>
+              <a:t>GitHub repository: https://github.com/Nguh-Prince/Intro-to-AI</a:t>
+            </a:r>
+          </a:p>
+        </p:txBody>
+      </p:sp>
     </p:spTree>
     <p:extLst>
       <p:ext uri="{BB962C8B-B14F-4D97-AF65-F5344CB8AC3E}">
@@ -3616,6 +4033,34 @@
           </a:p>
         </p:txBody>
       </p:sp>
+      <p:sp>
+        <p:nvSpPr>
+          <p:cNvPr id="4" name="Footer Placeholder 3">
+            <a:extLst>
+              <a:ext uri="{FF2B5EF4-FFF2-40B4-BE49-F238E27FC236}">
+                <a16:creationId xmlns:a16="http://schemas.microsoft.com/office/drawing/2014/main" id="{E705826C-A2F3-A50F-A0CF-72E683AD16F5}"/>
+              </a:ext>
+            </a:extLst>
+          </p:cNvPr>
+          <p:cNvSpPr>
+            <a:spLocks noGrp="1"/>
+          </p:cNvSpPr>
+          <p:nvPr>
+            <p:ph type="ftr" sz="quarter" idx="11"/>
+          </p:nvPr>
+        </p:nvSpPr>
+        <p:spPr/>
+        <p:txBody>
+          <a:bodyPr/>
+          <a:lstStyle/>
+          <a:p>
+            <a:r>
+              <a:rPr lang="en-US"/>
+              <a:t>GitHub repository: https://github.com/Nguh-Prince/Intro-to-AI</a:t>
+            </a:r>
+          </a:p>
+        </p:txBody>
+      </p:sp>
     </p:spTree>
     <p:extLst>
       <p:ext uri="{BB962C8B-B14F-4D97-AF65-F5344CB8AC3E}">
@@ -3744,6 +4189,34 @@
           </a:p>
         </p:txBody>
       </p:sp>
+      <p:sp>
+        <p:nvSpPr>
+          <p:cNvPr id="4" name="Footer Placeholder 3">
+            <a:extLst>
+              <a:ext uri="{FF2B5EF4-FFF2-40B4-BE49-F238E27FC236}">
+                <a16:creationId xmlns:a16="http://schemas.microsoft.com/office/drawing/2014/main" id="{51978318-FB4A-64BC-58B9-FDCD8F78333C}"/>
+              </a:ext>
+            </a:extLst>
+          </p:cNvPr>
+          <p:cNvSpPr>
+            <a:spLocks noGrp="1"/>
+          </p:cNvSpPr>
+          <p:nvPr>
+            <p:ph type="ftr" sz="quarter" idx="11"/>
+          </p:nvPr>
+        </p:nvSpPr>
+        <p:spPr/>
+        <p:txBody>
+          <a:bodyPr/>
+          <a:lstStyle/>
+          <a:p>
+            <a:r>
+              <a:rPr lang="en-US"/>
+              <a:t>GitHub repository: https://github.com/Nguh-Prince/Intro-to-AI</a:t>
+            </a:r>
+          </a:p>
+        </p:txBody>
+      </p:sp>
     </p:spTree>
     <p:extLst>
       <p:ext uri="{BB962C8B-B14F-4D97-AF65-F5344CB8AC3E}">
@@ -3848,6 +4321,34 @@
           </a:p>
         </p:txBody>
       </p:sp>
+      <p:sp>
+        <p:nvSpPr>
+          <p:cNvPr id="4" name="Footer Placeholder 3">
+            <a:extLst>
+              <a:ext uri="{FF2B5EF4-FFF2-40B4-BE49-F238E27FC236}">
+                <a16:creationId xmlns:a16="http://schemas.microsoft.com/office/drawing/2014/main" id="{5CC5BFD1-C69F-9EF6-2B40-567DCB3953A1}"/>
+              </a:ext>
+            </a:extLst>
+          </p:cNvPr>
+          <p:cNvSpPr>
+            <a:spLocks noGrp="1"/>
+          </p:cNvSpPr>
+          <p:nvPr>
+            <p:ph type="ftr" sz="quarter" idx="11"/>
+          </p:nvPr>
+        </p:nvSpPr>
+        <p:spPr/>
+        <p:txBody>
+          <a:bodyPr/>
+          <a:lstStyle/>
+          <a:p>
+            <a:r>
+              <a:rPr lang="en-US"/>
+              <a:t>GitHub repository: https://github.com/Nguh-Prince/Intro-to-AI</a:t>
+            </a:r>
+          </a:p>
+        </p:txBody>
+      </p:sp>
     </p:spTree>
     <p:extLst>
       <p:ext uri="{BB962C8B-B14F-4D97-AF65-F5344CB8AC3E}">
@@ -3985,6 +4486,34 @@
           </a:p>
         </p:txBody>
       </p:sp>
+      <p:sp>
+        <p:nvSpPr>
+          <p:cNvPr id="4" name="Footer Placeholder 3">
+            <a:extLst>
+              <a:ext uri="{FF2B5EF4-FFF2-40B4-BE49-F238E27FC236}">
+                <a16:creationId xmlns:a16="http://schemas.microsoft.com/office/drawing/2014/main" id="{74E39322-9EFF-41F7-0376-B661BEF81A77}"/>
+              </a:ext>
+            </a:extLst>
+          </p:cNvPr>
+          <p:cNvSpPr>
+            <a:spLocks noGrp="1"/>
+          </p:cNvSpPr>
+          <p:nvPr>
+            <p:ph type="ftr" sz="quarter" idx="11"/>
+          </p:nvPr>
+        </p:nvSpPr>
+        <p:spPr/>
+        <p:txBody>
+          <a:bodyPr/>
+          <a:lstStyle/>
+          <a:p>
+            <a:r>
+              <a:rPr lang="en-US"/>
+              <a:t>GitHub repository: https://github.com/Nguh-Prince/Intro-to-AI</a:t>
+            </a:r>
+          </a:p>
+        </p:txBody>
+      </p:sp>
     </p:spTree>
     <p:extLst>
       <p:ext uri="{BB962C8B-B14F-4D97-AF65-F5344CB8AC3E}">
@@ -4095,6 +4624,34 @@
           </a:p>
         </p:txBody>
       </p:sp>
+      <p:sp>
+        <p:nvSpPr>
+          <p:cNvPr id="4" name="Footer Placeholder 3">
+            <a:extLst>
+              <a:ext uri="{FF2B5EF4-FFF2-40B4-BE49-F238E27FC236}">
+                <a16:creationId xmlns:a16="http://schemas.microsoft.com/office/drawing/2014/main" id="{2E26CAEE-481F-D3EB-D766-C1486A2BBE4F}"/>
+              </a:ext>
+            </a:extLst>
+          </p:cNvPr>
+          <p:cNvSpPr>
+            <a:spLocks noGrp="1"/>
+          </p:cNvSpPr>
+          <p:nvPr>
+            <p:ph type="ftr" sz="quarter" idx="11"/>
+          </p:nvPr>
+        </p:nvSpPr>
+        <p:spPr/>
+        <p:txBody>
+          <a:bodyPr/>
+          <a:lstStyle/>
+          <a:p>
+            <a:r>
+              <a:rPr lang="en-US"/>
+              <a:t>GitHub repository: https://github.com/Nguh-Prince/Intro-to-AI</a:t>
+            </a:r>
+          </a:p>
+        </p:txBody>
+      </p:sp>
     </p:spTree>
     <p:extLst>
       <p:ext uri="{BB962C8B-B14F-4D97-AF65-F5344CB8AC3E}">
@@ -4228,6 +4785,34 @@
           </a:p>
         </p:txBody>
       </p:sp>
+      <p:sp>
+        <p:nvSpPr>
+          <p:cNvPr id="4" name="Footer Placeholder 3">
+            <a:extLst>
+              <a:ext uri="{FF2B5EF4-FFF2-40B4-BE49-F238E27FC236}">
+                <a16:creationId xmlns:a16="http://schemas.microsoft.com/office/drawing/2014/main" id="{91CF8C71-6589-7FDC-E246-C1708658F9BA}"/>
+              </a:ext>
+            </a:extLst>
+          </p:cNvPr>
+          <p:cNvSpPr>
+            <a:spLocks noGrp="1"/>
+          </p:cNvSpPr>
+          <p:nvPr>
+            <p:ph type="ftr" sz="quarter" idx="11"/>
+          </p:nvPr>
+        </p:nvSpPr>
+        <p:spPr/>
+        <p:txBody>
+          <a:bodyPr/>
+          <a:lstStyle/>
+          <a:p>
+            <a:r>
+              <a:rPr lang="en-US"/>
+              <a:t>GitHub repository: https://github.com/Nguh-Prince/Intro-to-AI</a:t>
+            </a:r>
+          </a:p>
+        </p:txBody>
+      </p:sp>
     </p:spTree>
     <p:extLst>
       <p:ext uri="{BB962C8B-B14F-4D97-AF65-F5344CB8AC3E}">
@@ -4372,6 +4957,34 @@
           </a:p>
         </p:txBody>
       </p:sp>
+      <p:sp>
+        <p:nvSpPr>
+          <p:cNvPr id="4" name="Footer Placeholder 3">
+            <a:extLst>
+              <a:ext uri="{FF2B5EF4-FFF2-40B4-BE49-F238E27FC236}">
+                <a16:creationId xmlns:a16="http://schemas.microsoft.com/office/drawing/2014/main" id="{5697F66F-DD3A-28EB-1227-35C5C886D072}"/>
+              </a:ext>
+            </a:extLst>
+          </p:cNvPr>
+          <p:cNvSpPr>
+            <a:spLocks noGrp="1"/>
+          </p:cNvSpPr>
+          <p:nvPr>
+            <p:ph type="ftr" sz="quarter" idx="11"/>
+          </p:nvPr>
+        </p:nvSpPr>
+        <p:spPr/>
+        <p:txBody>
+          <a:bodyPr/>
+          <a:lstStyle/>
+          <a:p>
+            <a:r>
+              <a:rPr lang="en-US"/>
+              <a:t>GitHub repository: https://github.com/Nguh-Prince/Intro-to-AI</a:t>
+            </a:r>
+          </a:p>
+        </p:txBody>
+      </p:sp>
     </p:spTree>
     <p:extLst>
       <p:ext uri="{BB962C8B-B14F-4D97-AF65-F5344CB8AC3E}">
@@ -4482,6 +5095,34 @@
           </a:p>
         </p:txBody>
       </p:sp>
+      <p:sp>
+        <p:nvSpPr>
+          <p:cNvPr id="4" name="Footer Placeholder 3">
+            <a:extLst>
+              <a:ext uri="{FF2B5EF4-FFF2-40B4-BE49-F238E27FC236}">
+                <a16:creationId xmlns:a16="http://schemas.microsoft.com/office/drawing/2014/main" id="{218D38E9-53F6-0F8E-A8B7-E3AD13AED295}"/>
+              </a:ext>
+            </a:extLst>
+          </p:cNvPr>
+          <p:cNvSpPr>
+            <a:spLocks noGrp="1"/>
+          </p:cNvSpPr>
+          <p:nvPr>
+            <p:ph type="ftr" sz="quarter" idx="11"/>
+          </p:nvPr>
+        </p:nvSpPr>
+        <p:spPr/>
+        <p:txBody>
+          <a:bodyPr/>
+          <a:lstStyle/>
+          <a:p>
+            <a:r>
+              <a:rPr lang="en-US"/>
+              <a:t>GitHub repository: https://github.com/Nguh-Prince/Intro-to-AI</a:t>
+            </a:r>
+          </a:p>
+        </p:txBody>
+      </p:sp>
     </p:spTree>
     <p:extLst>
       <p:ext uri="{BB962C8B-B14F-4D97-AF65-F5344CB8AC3E}">
@@ -4717,6 +5358,34 @@
           </a:p>
         </p:txBody>
       </p:sp>
+      <p:sp>
+        <p:nvSpPr>
+          <p:cNvPr id="4" name="Footer Placeholder 3">
+            <a:extLst>
+              <a:ext uri="{FF2B5EF4-FFF2-40B4-BE49-F238E27FC236}">
+                <a16:creationId xmlns:a16="http://schemas.microsoft.com/office/drawing/2014/main" id="{41FC84C4-3BFA-8847-AD03-08D8FAAE665B}"/>
+              </a:ext>
+            </a:extLst>
+          </p:cNvPr>
+          <p:cNvSpPr>
+            <a:spLocks noGrp="1"/>
+          </p:cNvSpPr>
+          <p:nvPr>
+            <p:ph type="ftr" sz="quarter" idx="11"/>
+          </p:nvPr>
+        </p:nvSpPr>
+        <p:spPr/>
+        <p:txBody>
+          <a:bodyPr/>
+          <a:lstStyle/>
+          <a:p>
+            <a:r>
+              <a:rPr lang="en-US"/>
+              <a:t>GitHub repository: https://github.com/Nguh-Prince/Intro-to-AI</a:t>
+            </a:r>
+          </a:p>
+        </p:txBody>
+      </p:sp>
     </p:spTree>
     <p:extLst>
       <p:ext uri="{BB962C8B-B14F-4D97-AF65-F5344CB8AC3E}">
@@ -4861,6 +5530,34 @@
           </a:p>
         </p:txBody>
       </p:sp>
+      <p:sp>
+        <p:nvSpPr>
+          <p:cNvPr id="4" name="Footer Placeholder 3">
+            <a:extLst>
+              <a:ext uri="{FF2B5EF4-FFF2-40B4-BE49-F238E27FC236}">
+                <a16:creationId xmlns:a16="http://schemas.microsoft.com/office/drawing/2014/main" id="{071008CD-33EC-0CEA-82DF-BDBA56675BA2}"/>
+              </a:ext>
+            </a:extLst>
+          </p:cNvPr>
+          <p:cNvSpPr>
+            <a:spLocks noGrp="1"/>
+          </p:cNvSpPr>
+          <p:nvPr>
+            <p:ph type="ftr" sz="quarter" idx="11"/>
+          </p:nvPr>
+        </p:nvSpPr>
+        <p:spPr/>
+        <p:txBody>
+          <a:bodyPr/>
+          <a:lstStyle/>
+          <a:p>
+            <a:r>
+              <a:rPr lang="en-US"/>
+              <a:t>GitHub repository: https://github.com/Nguh-Prince/Intro-to-AI</a:t>
+            </a:r>
+          </a:p>
+        </p:txBody>
+      </p:sp>
     </p:spTree>
     <p:extLst>
       <p:ext uri="{BB962C8B-B14F-4D97-AF65-F5344CB8AC3E}">
@@ -4991,6 +5688,34 @@
               <a:buNone/>
             </a:pPr>
             <a:endParaRPr lang="en-US" dirty="0"/>
+          </a:p>
+        </p:txBody>
+      </p:sp>
+      <p:sp>
+        <p:nvSpPr>
+          <p:cNvPr id="4" name="Footer Placeholder 3">
+            <a:extLst>
+              <a:ext uri="{FF2B5EF4-FFF2-40B4-BE49-F238E27FC236}">
+                <a16:creationId xmlns:a16="http://schemas.microsoft.com/office/drawing/2014/main" id="{C8F93245-8883-D2DC-40CA-FFA2076C3A69}"/>
+              </a:ext>
+            </a:extLst>
+          </p:cNvPr>
+          <p:cNvSpPr>
+            <a:spLocks noGrp="1"/>
+          </p:cNvSpPr>
+          <p:nvPr>
+            <p:ph type="ftr" sz="quarter" idx="11"/>
+          </p:nvPr>
+        </p:nvSpPr>
+        <p:spPr/>
+        <p:txBody>
+          <a:bodyPr/>
+          <a:lstStyle/>
+          <a:p>
+            <a:r>
+              <a:rPr lang="en-US"/>
+              <a:t>GitHub repository: https://github.com/Nguh-Prince/Intro-to-AI</a:t>
+            </a:r>
           </a:p>
         </p:txBody>
       </p:sp>
@@ -5300,4 +6025,299 @@
     </a:ext>
   </a:extLst>
 </a:theme>
+</file>
+
+<file path=ppt/theme/theme2.xml><?xml version="1.0" encoding="utf-8"?>
+<a:theme xmlns:a="http://schemas.openxmlformats.org/drawingml/2006/main" name="Office Theme">
+  <a:themeElements>
+    <a:clrScheme name="Office">
+      <a:dk1>
+        <a:sysClr val="windowText" lastClr="000000"/>
+      </a:dk1>
+      <a:lt1>
+        <a:sysClr val="window" lastClr="FFFFFF"/>
+      </a:lt1>
+      <a:dk2>
+        <a:srgbClr val="44546A"/>
+      </a:dk2>
+      <a:lt2>
+        <a:srgbClr val="E7E6E6"/>
+      </a:lt2>
+      <a:accent1>
+        <a:srgbClr val="4472C4"/>
+      </a:accent1>
+      <a:accent2>
+        <a:srgbClr val="ED7D31"/>
+      </a:accent2>
+      <a:accent3>
+        <a:srgbClr val="A5A5A5"/>
+      </a:accent3>
+      <a:accent4>
+        <a:srgbClr val="FFC000"/>
+      </a:accent4>
+      <a:accent5>
+        <a:srgbClr val="5B9BD5"/>
+      </a:accent5>
+      <a:accent6>
+        <a:srgbClr val="70AD47"/>
+      </a:accent6>
+      <a:hlink>
+        <a:srgbClr val="0563C1"/>
+      </a:hlink>
+      <a:folHlink>
+        <a:srgbClr val="954F72"/>
+      </a:folHlink>
+    </a:clrScheme>
+    <a:fontScheme name="Office">
+      <a:majorFont>
+        <a:latin typeface="Calibri Light" panose="020F0302020204030204"/>
+        <a:ea typeface=""/>
+        <a:cs typeface=""/>
+        <a:font script="Jpan" typeface="游ゴシック Light"/>
+        <a:font script="Hang" typeface="맑은 고딕"/>
+        <a:font script="Hans" typeface="等线 Light"/>
+        <a:font script="Hant" typeface="新細明體"/>
+        <a:font script="Arab" typeface="Times New Roman"/>
+        <a:font script="Hebr" typeface="Times New Roman"/>
+        <a:font script="Thai" typeface="Angsana New"/>
+        <a:font script="Ethi" typeface="Nyala"/>
+        <a:font script="Beng" typeface="Vrinda"/>
+        <a:font script="Gujr" typeface="Shruti"/>
+        <a:font script="Khmr" typeface="MoolBoran"/>
+        <a:font script="Knda" typeface="Tunga"/>
+        <a:font script="Guru" typeface="Raavi"/>
+        <a:font script="Cans" typeface="Euphemia"/>
+        <a:font script="Cher" typeface="Plantagenet Cherokee"/>
+        <a:font script="Yiii" typeface="Microsoft Yi Baiti"/>
+        <a:font script="Tibt" typeface="Microsoft Himalaya"/>
+        <a:font script="Thaa" typeface="MV Boli"/>
+        <a:font script="Deva" typeface="Mangal"/>
+        <a:font script="Telu" typeface="Gautami"/>
+        <a:font script="Taml" typeface="Latha"/>
+        <a:font script="Syrc" typeface="Estrangelo Edessa"/>
+        <a:font script="Orya" typeface="Kalinga"/>
+        <a:font script="Mlym" typeface="Kartika"/>
+        <a:font script="Laoo" typeface="DokChampa"/>
+        <a:font script="Sinh" typeface="Iskoola Pota"/>
+        <a:font script="Mong" typeface="Mongolian Baiti"/>
+        <a:font script="Viet" typeface="Times New Roman"/>
+        <a:font script="Uigh" typeface="Microsoft Uighur"/>
+        <a:font script="Geor" typeface="Sylfaen"/>
+        <a:font script="Armn" typeface="Arial"/>
+        <a:font script="Bugi" typeface="Leelawadee UI"/>
+        <a:font script="Bopo" typeface="Microsoft JhengHei"/>
+        <a:font script="Java" typeface="Javanese Text"/>
+        <a:font script="Lisu" typeface="Segoe UI"/>
+        <a:font script="Mymr" typeface="Myanmar Text"/>
+        <a:font script="Nkoo" typeface="Ebrima"/>
+        <a:font script="Olck" typeface="Nirmala UI"/>
+        <a:font script="Osma" typeface="Ebrima"/>
+        <a:font script="Phag" typeface="Phagspa"/>
+        <a:font script="Syrn" typeface="Estrangelo Edessa"/>
+        <a:font script="Syrj" typeface="Estrangelo Edessa"/>
+        <a:font script="Syre" typeface="Estrangelo Edessa"/>
+        <a:font script="Sora" typeface="Nirmala UI"/>
+        <a:font script="Tale" typeface="Microsoft Tai Le"/>
+        <a:font script="Talu" typeface="Microsoft New Tai Lue"/>
+        <a:font script="Tfng" typeface="Ebrima"/>
+      </a:majorFont>
+      <a:minorFont>
+        <a:latin typeface="Calibri" panose="020F0502020204030204"/>
+        <a:ea typeface=""/>
+        <a:cs typeface=""/>
+        <a:font script="Jpan" typeface="游ゴシック"/>
+        <a:font script="Hang" typeface="맑은 고딕"/>
+        <a:font script="Hans" typeface="等线"/>
+        <a:font script="Hant" typeface="新細明體"/>
+        <a:font script="Arab" typeface="Arial"/>
+        <a:font script="Hebr" typeface="Arial"/>
+        <a:font script="Thai" typeface="Cordia New"/>
+        <a:font script="Ethi" typeface="Nyala"/>
+        <a:font script="Beng" typeface="Vrinda"/>
+        <a:font script="Gujr" typeface="Shruti"/>
+        <a:font script="Khmr" typeface="DaunPenh"/>
+        <a:font script="Knda" typeface="Tunga"/>
+        <a:font script="Guru" typeface="Raavi"/>
+        <a:font script="Cans" typeface="Euphemia"/>
+        <a:font script="Cher" typeface="Plantagenet Cherokee"/>
+        <a:font script="Yiii" typeface="Microsoft Yi Baiti"/>
+        <a:font script="Tibt" typeface="Microsoft Himalaya"/>
+        <a:font script="Thaa" typeface="MV Boli"/>
+        <a:font script="Deva" typeface="Mangal"/>
+        <a:font script="Telu" typeface="Gautami"/>
+        <a:font script="Taml" typeface="Latha"/>
+        <a:font script="Syrc" typeface="Estrangelo Edessa"/>
+        <a:font script="Orya" typeface="Kalinga"/>
+        <a:font script="Mlym" typeface="Kartika"/>
+        <a:font script="Laoo" typeface="DokChampa"/>
+        <a:font script="Sinh" typeface="Iskoola Pota"/>
+        <a:font script="Mong" typeface="Mongolian Baiti"/>
+        <a:font script="Viet" typeface="Arial"/>
+        <a:font script="Uigh" typeface="Microsoft Uighur"/>
+        <a:font script="Geor" typeface="Sylfaen"/>
+        <a:font script="Armn" typeface="Arial"/>
+        <a:font script="Bugi" typeface="Leelawadee UI"/>
+        <a:font script="Bopo" typeface="Microsoft JhengHei"/>
+        <a:font script="Java" typeface="Javanese Text"/>
+        <a:font script="Lisu" typeface="Segoe UI"/>
+        <a:font script="Mymr" typeface="Myanmar Text"/>
+        <a:font script="Nkoo" typeface="Ebrima"/>
+        <a:font script="Olck" typeface="Nirmala UI"/>
+        <a:font script="Osma" typeface="Ebrima"/>
+        <a:font script="Phag" typeface="Phagspa"/>
+        <a:font script="Syrn" typeface="Estrangelo Edessa"/>
+        <a:font script="Syrj" typeface="Estrangelo Edessa"/>
+        <a:font script="Syre" typeface="Estrangelo Edessa"/>
+        <a:font script="Sora" typeface="Nirmala UI"/>
+        <a:font script="Tale" typeface="Microsoft Tai Le"/>
+        <a:font script="Talu" typeface="Microsoft New Tai Lue"/>
+        <a:font script="Tfng" typeface="Ebrima"/>
+      </a:minorFont>
+    </a:fontScheme>
+    <a:fmtScheme name="Office">
+      <a:fillStyleLst>
+        <a:solidFill>
+          <a:schemeClr val="phClr"/>
+        </a:solidFill>
+        <a:gradFill rotWithShape="1">
+          <a:gsLst>
+            <a:gs pos="0">
+              <a:schemeClr val="phClr">
+                <a:lumMod val="110000"/>
+                <a:satMod val="105000"/>
+                <a:tint val="67000"/>
+              </a:schemeClr>
+            </a:gs>
+            <a:gs pos="50000">
+              <a:schemeClr val="phClr">
+                <a:lumMod val="105000"/>
+                <a:satMod val="103000"/>
+                <a:tint val="73000"/>
+              </a:schemeClr>
+            </a:gs>
+            <a:gs pos="100000">
+              <a:schemeClr val="phClr">
+                <a:lumMod val="105000"/>
+                <a:satMod val="109000"/>
+                <a:tint val="81000"/>
+              </a:schemeClr>
+            </a:gs>
+          </a:gsLst>
+          <a:lin ang="5400000" scaled="0"/>
+        </a:gradFill>
+        <a:gradFill rotWithShape="1">
+          <a:gsLst>
+            <a:gs pos="0">
+              <a:schemeClr val="phClr">
+                <a:satMod val="103000"/>
+                <a:lumMod val="102000"/>
+                <a:tint val="94000"/>
+              </a:schemeClr>
+            </a:gs>
+            <a:gs pos="50000">
+              <a:schemeClr val="phClr">
+                <a:satMod val="110000"/>
+                <a:lumMod val="100000"/>
+                <a:shade val="100000"/>
+              </a:schemeClr>
+            </a:gs>
+            <a:gs pos="100000">
+              <a:schemeClr val="phClr">
+                <a:lumMod val="99000"/>
+                <a:satMod val="120000"/>
+                <a:shade val="78000"/>
+              </a:schemeClr>
+            </a:gs>
+          </a:gsLst>
+          <a:lin ang="5400000" scaled="0"/>
+        </a:gradFill>
+      </a:fillStyleLst>
+      <a:lnStyleLst>
+        <a:ln w="6350" cap="flat" cmpd="sng" algn="ctr">
+          <a:solidFill>
+            <a:schemeClr val="phClr"/>
+          </a:solidFill>
+          <a:prstDash val="solid"/>
+          <a:miter lim="800000"/>
+        </a:ln>
+        <a:ln w="12700" cap="flat" cmpd="sng" algn="ctr">
+          <a:solidFill>
+            <a:schemeClr val="phClr"/>
+          </a:solidFill>
+          <a:prstDash val="solid"/>
+          <a:miter lim="800000"/>
+        </a:ln>
+        <a:ln w="19050" cap="flat" cmpd="sng" algn="ctr">
+          <a:solidFill>
+            <a:schemeClr val="phClr"/>
+          </a:solidFill>
+          <a:prstDash val="solid"/>
+          <a:miter lim="800000"/>
+        </a:ln>
+      </a:lnStyleLst>
+      <a:effectStyleLst>
+        <a:effectStyle>
+          <a:effectLst/>
+        </a:effectStyle>
+        <a:effectStyle>
+          <a:effectLst/>
+        </a:effectStyle>
+        <a:effectStyle>
+          <a:effectLst>
+            <a:outerShdw blurRad="57150" dist="19050" dir="5400000" algn="ctr" rotWithShape="0">
+              <a:srgbClr val="000000">
+                <a:alpha val="63000"/>
+              </a:srgbClr>
+            </a:outerShdw>
+          </a:effectLst>
+        </a:effectStyle>
+      </a:effectStyleLst>
+      <a:bgFillStyleLst>
+        <a:solidFill>
+          <a:schemeClr val="phClr"/>
+        </a:solidFill>
+        <a:solidFill>
+          <a:schemeClr val="phClr">
+            <a:tint val="95000"/>
+            <a:satMod val="170000"/>
+          </a:schemeClr>
+        </a:solidFill>
+        <a:gradFill rotWithShape="1">
+          <a:gsLst>
+            <a:gs pos="0">
+              <a:schemeClr val="phClr">
+                <a:tint val="93000"/>
+                <a:satMod val="150000"/>
+                <a:shade val="98000"/>
+                <a:lumMod val="102000"/>
+              </a:schemeClr>
+            </a:gs>
+            <a:gs pos="50000">
+              <a:schemeClr val="phClr">
+                <a:tint val="98000"/>
+                <a:satMod val="130000"/>
+                <a:shade val="90000"/>
+                <a:lumMod val="103000"/>
+              </a:schemeClr>
+            </a:gs>
+            <a:gs pos="100000">
+              <a:schemeClr val="phClr">
+                <a:shade val="63000"/>
+                <a:satMod val="120000"/>
+              </a:schemeClr>
+            </a:gs>
+          </a:gsLst>
+          <a:lin ang="5400000" scaled="0"/>
+        </a:gradFill>
+      </a:bgFillStyleLst>
+    </a:fmtScheme>
+  </a:themeElements>
+  <a:objectDefaults/>
+  <a:extraClrSchemeLst/>
+  <a:extLst>
+    <a:ext uri="{05A4C25C-085E-4340-85A3-A5531E510DB2}">
+      <thm15:themeFamily xmlns:thm15="http://schemas.microsoft.com/office/thememl/2012/main" name="Office Theme" id="{62F939B6-93AF-4DB8-9C6B-D6C7DFDC589F}" vid="{4A3C46E8-61CC-4603-A589-7422A47A8E4A}"/>
+    </a:ext>
+  </a:extLst>
+</a:theme>
 </file>
</xml_diff>